<commit_message>
20jun add script / minor update slides
</commit_message>
<xml_diff>
--- a/presentation/haggerty_energy_gdp_1.pptx
+++ b/presentation/haggerty_energy_gdp_1.pptx
@@ -232,7 +232,7 @@
           <a:p>
             <a:fld id="{7487ADD9-2083-264C-A652-8D52D02F7E72}" type="datetimeFigureOut">
               <a:rPr lang="en-US" smtClean="0"/>
-              <a:t>6/19/2023</a:t>
+              <a:t>6/20/2023</a:t>
             </a:fld>
             <a:endParaRPr lang="en-US" dirty="0"/>
           </a:p>
@@ -1982,7 +1982,7 @@
             <a:fld id="{5F02DCD1-2C6B-F948-9F72-3BB0CF3D512E}" type="datetime1">
               <a:rPr lang="en-US" smtClean="0"/>
               <a:pPr/>
-              <a:t>6/19/2023</a:t>
+              <a:t>6/20/2023</a:t>
             </a:fld>
             <a:endParaRPr lang="en-US" dirty="0"/>
           </a:p>
@@ -2867,7 +2867,7 @@
             <a:fld id="{C1583C39-01BF-7F43-854C-FBB4E9AB6B0C}" type="datetime1">
               <a:rPr lang="en-US" smtClean="0"/>
               <a:pPr/>
-              <a:t>6/19/2023</a:t>
+              <a:t>6/20/2023</a:t>
             </a:fld>
             <a:endParaRPr lang="en-US" dirty="0"/>
           </a:p>
@@ -4044,7 +4044,7 @@
             <a:fld id="{4B103E64-1627-9140-8127-1849FED275E1}" type="datetime1">
               <a:rPr lang="en-US" smtClean="0"/>
               <a:pPr/>
-              <a:t>6/19/2023</a:t>
+              <a:t>6/20/2023</a:t>
             </a:fld>
             <a:endParaRPr lang="en-US" dirty="0"/>
           </a:p>
@@ -6124,7 +6124,7 @@
             <a:fld id="{DD9C8446-696E-6942-B6C8-CC9CAD0B34E0}" type="datetime1">
               <a:rPr lang="en-US" smtClean="0"/>
               <a:pPr/>
-              <a:t>6/19/2023</a:t>
+              <a:t>6/20/2023</a:t>
             </a:fld>
             <a:endParaRPr lang="en-US" dirty="0"/>
           </a:p>
@@ -6842,7 +6842,7 @@
             <a:fld id="{F5592931-05C6-8543-8B6E-A8BD29BD5C2B}" type="datetime1">
               <a:rPr lang="en-US" smtClean="0"/>
               <a:pPr/>
-              <a:t>6/19/2023</a:t>
+              <a:t>6/20/2023</a:t>
             </a:fld>
             <a:endParaRPr lang="en-US" dirty="0"/>
           </a:p>
@@ -8070,7 +8070,7 @@
             <a:fld id="{7E7AB22C-8B7E-9B4A-8C65-396C3C874D86}" type="datetime1">
               <a:rPr lang="en-US" smtClean="0"/>
               <a:pPr/>
-              <a:t>6/19/2023</a:t>
+              <a:t>6/20/2023</a:t>
             </a:fld>
             <a:endParaRPr lang="en-US" dirty="0"/>
           </a:p>
@@ -8662,7 +8662,7 @@
             <a:fld id="{8CE9AC2A-20AD-8C48-B5EB-B5322BDBCDEE}" type="datetime1">
               <a:rPr lang="en-US" smtClean="0"/>
               <a:pPr/>
-              <a:t>6/19/2023</a:t>
+              <a:t>6/20/2023</a:t>
             </a:fld>
             <a:endParaRPr lang="en-US" dirty="0"/>
           </a:p>
@@ -9135,7 +9135,7 @@
             <a:fld id="{4CF75428-5BE0-934D-BB71-675F8E23A386}" type="datetime1">
               <a:rPr lang="en-US" smtClean="0"/>
               <a:pPr/>
-              <a:t>6/19/2023</a:t>
+              <a:t>6/20/2023</a:t>
             </a:fld>
             <a:endParaRPr lang="en-US" dirty="0"/>
           </a:p>
@@ -9985,7 +9985,7 @@
             <a:fld id="{9A85C5CA-AE29-AB4C-8F85-0373C72001D8}" type="datetime1">
               <a:rPr lang="en-US" smtClean="0"/>
               <a:pPr/>
-              <a:t>6/19/2023</a:t>
+              <a:t>6/20/2023</a:t>
             </a:fld>
             <a:endParaRPr lang="en-US" dirty="0"/>
           </a:p>
@@ -12210,7 +12210,7 @@
             <a:fld id="{75594855-01E8-5A4B-B2B8-E2ECEF879100}" type="datetime1">
               <a:rPr lang="en-US" smtClean="0"/>
               <a:pPr/>
-              <a:t>6/19/2023</a:t>
+              <a:t>6/20/2023</a:t>
             </a:fld>
             <a:endParaRPr lang="en-US" dirty="0"/>
           </a:p>
@@ -12479,7 +12479,7 @@
             <a:fld id="{B562DF68-3089-814D-8A14-C651FE91885E}" type="datetime1">
               <a:rPr lang="en-US" smtClean="0"/>
               <a:pPr/>
-              <a:t>6/19/2023</a:t>
+              <a:t>6/20/2023</a:t>
             </a:fld>
             <a:endParaRPr lang="en-US" dirty="0"/>
           </a:p>
@@ -13255,7 +13255,7 @@
                 <a:tabLst/>
                 <a:defRPr/>
               </a:pPr>
-              <a:t>6/19/2023</a:t>
+              <a:t>6/20/2023</a:t>
             </a:fld>
             <a:endParaRPr kumimoji="0" lang="en-US" sz="1200" b="0" i="0" u="none" strike="noStrike" kern="1200" cap="none" spc="0" normalizeH="0" baseline="0" noProof="0" dirty="0">
               <a:ln>
@@ -13958,7 +13958,7 @@
                 <a:tabLst/>
                 <a:defRPr/>
               </a:pPr>
-              <a:t>6/19/2023</a:t>
+              <a:t>6/20/2023</a:t>
             </a:fld>
             <a:endParaRPr kumimoji="0" lang="en-US" sz="1200" b="0" i="0" u="none" strike="noStrike" kern="1200" cap="none" spc="0" normalizeH="0" baseline="0" noProof="0" dirty="0">
               <a:ln>
@@ -14602,7 +14602,7 @@
                 <a:tabLst/>
                 <a:defRPr/>
               </a:pPr>
-              <a:t>6/19/2023</a:t>
+              <a:t>6/20/2023</a:t>
             </a:fld>
             <a:endParaRPr kumimoji="0" lang="en-US" sz="1200" b="0" i="0" u="none" strike="noStrike" kern="1200" cap="none" spc="0" normalizeH="0" baseline="0" noProof="0" dirty="0">
               <a:ln>
@@ -16471,7 +16471,7 @@
                 <a:tabLst/>
                 <a:defRPr/>
               </a:pPr>
-              <a:t>6/19/2023</a:t>
+              <a:t>6/20/2023</a:t>
             </a:fld>
             <a:endParaRPr kumimoji="0" lang="en-US" sz="1200" b="0" i="0" u="none" strike="noStrike" kern="1200" cap="none" spc="0" normalizeH="0" baseline="0" noProof="0" dirty="0">
               <a:ln>
@@ -18072,7 +18072,7 @@
                 <a:tabLst/>
                 <a:defRPr/>
               </a:pPr>
-              <a:t>6/19/2023</a:t>
+              <a:t>6/20/2023</a:t>
             </a:fld>
             <a:endParaRPr kumimoji="0" lang="en-US" sz="1200" b="0" i="0" u="none" strike="noStrike" kern="1200" cap="none" spc="0" normalizeH="0" baseline="0" noProof="0" dirty="0">
               <a:ln>
@@ -18717,7 +18717,7 @@
                 <a:tabLst/>
                 <a:defRPr/>
               </a:pPr>
-              <a:t>6/19/2023</a:t>
+              <a:t>6/20/2023</a:t>
             </a:fld>
             <a:endParaRPr kumimoji="0" lang="en-US" sz="1200" b="0" i="0" u="none" strike="noStrike" kern="1200" cap="none" spc="0" normalizeH="0" baseline="0" noProof="0" dirty="0">
               <a:ln>
@@ -19362,7 +19362,7 @@
                 <a:tabLst/>
                 <a:defRPr/>
               </a:pPr>
-              <a:t>6/19/2023</a:t>
+              <a:t>6/20/2023</a:t>
             </a:fld>
             <a:endParaRPr kumimoji="0" lang="en-US" sz="1200" b="0" i="0" u="none" strike="noStrike" kern="1200" cap="none" spc="0" normalizeH="0" baseline="0" noProof="0" dirty="0">
               <a:ln>
@@ -20341,7 +20341,7 @@
                 <a:tabLst/>
                 <a:defRPr/>
               </a:pPr>
-              <a:t>6/19/2023</a:t>
+              <a:t>6/20/2023</a:t>
             </a:fld>
             <a:endParaRPr kumimoji="0" lang="en-US" sz="1200" b="0" i="0" u="none" strike="noStrike" kern="1200" cap="none" spc="0" normalizeH="0" baseline="0" noProof="0" dirty="0">
               <a:ln>
@@ -21445,7 +21445,7 @@
             <a:fld id="{495D8227-9DE4-4D42-8C1B-E10C828BC634}" type="datetime1">
               <a:rPr lang="en-US" smtClean="0"/>
               <a:pPr/>
-              <a:t>6/19/2023</a:t>
+              <a:t>6/20/2023</a:t>
             </a:fld>
             <a:endParaRPr lang="en-US" dirty="0"/>
           </a:p>
@@ -21619,7 +21619,7 @@
                 <a:tabLst/>
                 <a:defRPr/>
               </a:pPr>
-              <a:t>6/19/2023</a:t>
+              <a:t>6/20/2023</a:t>
             </a:fld>
             <a:endParaRPr kumimoji="0" lang="en-US" sz="1200" b="0" i="0" u="none" strike="noStrike" kern="1200" cap="none" spc="0" normalizeH="0" baseline="0" noProof="0" dirty="0">
               <a:ln>
@@ -22609,7 +22609,7 @@
                 <a:tabLst/>
                 <a:defRPr/>
               </a:pPr>
-              <a:t>6/19/2023</a:t>
+              <a:t>6/20/2023</a:t>
             </a:fld>
             <a:endParaRPr kumimoji="0" lang="en-US" sz="1200" b="0" i="0" u="none" strike="noStrike" kern="1200" cap="none" spc="0" normalizeH="0" baseline="0" noProof="0" dirty="0">
               <a:ln>
@@ -23113,7 +23113,7 @@
                 <a:ea typeface="+mn-ea"/>
                 <a:cs typeface="+mn-cs"/>
               </a:rPr>
-              <a:t>35% of US Energy Projected for Renewables</a:t>
+              <a:t>35% of US Energy Supply Projected for Renewables</a:t>
             </a:r>
           </a:p>
           <a:p>
@@ -23210,7 +23210,41 @@
                 <a:ea typeface="+mn-ea"/>
                 <a:cs typeface="+mn-cs"/>
               </a:rPr>
-              <a:t>60.9% of US Energy of US Energy Projected for Renewables</a:t>
+              <a:t>60.9% of US </a:t>
+            </a:r>
+            <a:r>
+              <a:rPr kumimoji="0" lang="en-US" sz="1800" b="0" i="0" u="none" strike="noStrike" kern="1200" cap="none" spc="0" normalizeH="0" baseline="0" noProof="0">
+                <a:ln>
+                  <a:noFill/>
+                </a:ln>
+                <a:solidFill>
+                  <a:srgbClr val="000000"/>
+                </a:solidFill>
+                <a:effectLst/>
+                <a:uLnTx/>
+                <a:uFillTx/>
+                <a:latin typeface="Tenorite"/>
+                <a:ea typeface="+mn-ea"/>
+                <a:cs typeface="+mn-cs"/>
+              </a:rPr>
+              <a:t>Energy Supply </a:t>
+            </a:r>
+            <a:r>
+              <a:rPr kumimoji="0" lang="en-US" sz="1800" b="0" i="0" u="none" strike="noStrike" kern="1200" cap="none" spc="0" normalizeH="0" baseline="0" noProof="0" dirty="0">
+                <a:ln>
+                  <a:noFill/>
+                </a:ln>
+                <a:solidFill>
+                  <a:srgbClr val="000000"/>
+                </a:solidFill>
+                <a:effectLst/>
+                <a:uLnTx/>
+                <a:uFillTx/>
+                <a:latin typeface="Tenorite"/>
+                <a:ea typeface="+mn-ea"/>
+                <a:cs typeface="+mn-cs"/>
+              </a:rPr>
+              <a:t>of US Energy Projected for Renewables</a:t>
             </a:r>
           </a:p>
           <a:p>
@@ -24200,7 +24234,7 @@
             <a:fld id="{7FA0C2EE-8499-394A-A22C-DABDB4752AEE}" type="datetime1">
               <a:rPr lang="en-US" smtClean="0"/>
               <a:pPr/>
-              <a:t>6/19/2023</a:t>
+              <a:t>6/20/2023</a:t>
             </a:fld>
             <a:endParaRPr lang="en-US" dirty="0"/>
           </a:p>
@@ -24763,6 +24797,26 @@
             <a:endParaRPr lang="en-US" sz="1600" dirty="0"/>
           </a:p>
           <a:p>
+            <a:pPr marL="742950" lvl="1" indent="-285750">
+              <a:lnSpc>
+                <a:spcPct val="70000"/>
+              </a:lnSpc>
+              <a:buFont typeface="Arial" panose="020B0604020202020204" pitchFamily="34" charset="0"/>
+              <a:buChar char="•"/>
+            </a:pPr>
+            <a:r>
+              <a:rPr lang="en-US" sz="1600" dirty="0"/>
+              <a:t>World Energy Outlook 2022: </a:t>
+            </a:r>
+            <a:r>
+              <a:rPr lang="en-US" sz="1600" dirty="0">
+                <a:hlinkClick r:id="rId7"/>
+              </a:rPr>
+              <a:t>https://www.iea.org/data-and-statistics/data-product/world-energy-outlook-2022-free-dataset</a:t>
+            </a:r>
+            <a:endParaRPr lang="en-US" sz="1600" dirty="0"/>
+          </a:p>
+          <a:p>
             <a:pPr lvl="1">
               <a:lnSpc>
                 <a:spcPct val="70000"/>
@@ -24804,7 +24858,7 @@
             <a:fld id="{0B931EDA-BCF8-BB4B-B4D1-2CFE062FA080}" type="datetime1">
               <a:rPr lang="en-US" smtClean="0"/>
               <a:pPr/>
-              <a:t>6/19/2023</a:t>
+              <a:t>6/20/2023</a:t>
             </a:fld>
             <a:endParaRPr lang="en-US" dirty="0"/>
           </a:p>
@@ -24995,7 +25049,7 @@
         </p:spPr>
         <p:txBody>
           <a:bodyPr vert="horz" lIns="91440" tIns="45720" rIns="91440" bIns="45720" rtlCol="0" anchor="t">
-            <a:normAutofit fontScale="77500" lnSpcReduction="20000"/>
+            <a:normAutofit lnSpcReduction="10000"/>
           </a:bodyPr>
           <a:lstStyle/>
           <a:p>
@@ -25015,27 +25069,7 @@
             </a:pPr>
             <a:r>
               <a:rPr lang="en-US" dirty="0"/>
-              <a:t>This project compares how the production and consumption of energy compares to the gross domestic product (GDP) per capita at the state and national level focused on understanding the trajectory for movement away from fossil fuel as our primary energy source and its alignment to the nation’s leading fiscal metric. </a:t>
-            </a:r>
-          </a:p>
-          <a:p>
-            <a:pPr marL="342900" indent="-342900">
-              <a:buFont typeface="Arial" panose="020B0604020202020204" pitchFamily="34" charset="0"/>
-              <a:buChar char="•"/>
-            </a:pPr>
-            <a:r>
-              <a:rPr lang="en-US" dirty="0"/>
-              <a:t>Analysis utilized energy &amp; economic related data sets from the Bureau of Economic Analysis, US Census Bureau, Energy Information Agency, &amp; International Information Agency.</a:t>
-            </a:r>
-          </a:p>
-          <a:p>
-            <a:pPr marL="342900" indent="-342900">
-              <a:buFont typeface="Arial" panose="020B0604020202020204" pitchFamily="34" charset="0"/>
-              <a:buChar char="•"/>
-            </a:pPr>
-            <a:r>
-              <a:rPr lang="en-US" dirty="0"/>
-              <a:t>Years Reviewed: 1970, 1980, 1990, 2000, 2010, 2020</a:t>
+              <a:t>This project compares how the consumption and production of energy compares to the gross domestic product (GDP) per capita at the state and national level focused on understanding the trajectory for movement away from fossil fuel as our primary energy source and its alignment to the nation’s leading fiscal metric. </a:t>
             </a:r>
           </a:p>
         </p:txBody>
@@ -25069,7 +25103,7 @@
             <a:fld id="{E1707CF3-9BC4-A745-ACDA-A73543D800FE}" type="datetime1">
               <a:rPr lang="en-US" smtClean="0"/>
               <a:pPr/>
-              <a:t>6/19/2023</a:t>
+              <a:t>6/20/2023</a:t>
             </a:fld>
             <a:endParaRPr lang="en-US" dirty="0"/>
           </a:p>
@@ -25348,7 +25382,7 @@
         </p:spPr>
         <p:txBody>
           <a:bodyPr vert="horz" lIns="91440" tIns="45720" rIns="91440" bIns="45720" rtlCol="0" anchor="t">
-            <a:normAutofit fontScale="77500" lnSpcReduction="20000"/>
+            <a:normAutofit fontScale="70000" lnSpcReduction="20000"/>
           </a:bodyPr>
           <a:lstStyle/>
           <a:p>
@@ -25406,15 +25440,7 @@
           <a:p>
             <a:r>
               <a:rPr lang="en-US" dirty="0"/>
-              <a:t>Renewables: Includes Biofuels, Geothermal, Hydroelectric, Solar, </a:t>
-            </a:r>
-            <a:r>
-              <a:rPr lang="en-US" dirty="0" err="1"/>
-              <a:t>Wind,Wood</a:t>
-            </a:r>
-            <a:r>
-              <a:rPr lang="en-US" dirty="0"/>
-              <a:t>, &amp; Biomass Waste</a:t>
+              <a:t>Renewables: Includes Biofuels, Geothermal, Hydroelectric, Solar, Wind, Wood, &amp; Biomass Waste</a:t>
             </a:r>
           </a:p>
         </p:txBody>
@@ -25494,7 +25520,7 @@
                 <a:tabLst/>
                 <a:defRPr/>
               </a:pPr>
-              <a:t>6/19/2023</a:t>
+              <a:t>6/20/2023</a:t>
             </a:fld>
             <a:endParaRPr kumimoji="0" lang="en-US" sz="1200" b="0" i="0" u="none" strike="noStrike" kern="1200" cap="none" spc="0" normalizeH="0" baseline="0" noProof="0" dirty="0">
               <a:ln>
@@ -25838,7 +25864,7 @@
                 <a:tabLst/>
                 <a:defRPr/>
               </a:pPr>
-              <a:t>6/19/2023</a:t>
+              <a:t>6/20/2023</a:t>
             </a:fld>
             <a:endParaRPr kumimoji="0" lang="en-US" sz="1200" b="0" i="0" u="none" strike="noStrike" kern="1200" cap="none" spc="0" normalizeH="0" baseline="0" noProof="0" dirty="0">
               <a:ln>
@@ -27669,7 +27695,7 @@
                 <a:tabLst/>
                 <a:defRPr/>
               </a:pPr>
-              <a:t>6/19/2023</a:t>
+              <a:t>6/20/2023</a:t>
             </a:fld>
             <a:endParaRPr kumimoji="0" lang="en-US" sz="1200" b="0" i="0" u="none" strike="noStrike" kern="1200" cap="none" spc="0" normalizeH="0" baseline="0" noProof="0" dirty="0">
               <a:ln>
@@ -28888,7 +28914,7 @@
                 <a:tabLst/>
                 <a:defRPr/>
               </a:pPr>
-              <a:t>6/19/2023</a:t>
+              <a:t>6/20/2023</a:t>
             </a:fld>
             <a:endParaRPr kumimoji="0" lang="en-US" sz="1200" b="0" i="0" u="none" strike="noStrike" kern="1200" cap="none" spc="0" normalizeH="0" baseline="0" noProof="0" dirty="0">
               <a:ln>
@@ -29426,7 +29452,7 @@
                 <a:tabLst/>
                 <a:defRPr/>
               </a:pPr>
-              <a:t>6/19/2023</a:t>
+              <a:t>6/20/2023</a:t>
             </a:fld>
             <a:endParaRPr kumimoji="0" lang="en-US" sz="1200" b="0" i="0" u="none" strike="noStrike" kern="1200" cap="none" spc="0" normalizeH="0" baseline="0" noProof="0" dirty="0">
               <a:ln>
@@ -29847,7 +29873,7 @@
           <a:p>
             <a:r>
               <a:rPr lang="en-US" dirty="0"/>
-              <a:t>Overall Increase Expected to Continue</a:t>
+              <a:t>Overall Increase can be Expected to Continue</a:t>
             </a:r>
           </a:p>
         </p:txBody>

</xml_diff>

<commit_message>
21jun minor corrections for notes / script
</commit_message>
<xml_diff>
--- a/presentation/haggerty_energy_gdp_1.pptx
+++ b/presentation/haggerty_energy_gdp_1.pptx
@@ -232,7 +232,7 @@
           <a:p>
             <a:fld id="{7487ADD9-2083-264C-A652-8D52D02F7E72}" type="datetimeFigureOut">
               <a:rPr lang="en-US" smtClean="0"/>
-              <a:t>6/20/2023</a:t>
+              <a:t>6/21/2023</a:t>
             </a:fld>
             <a:endParaRPr lang="en-US" dirty="0"/>
           </a:p>
@@ -563,6 +563,19 @@
               </a:rPr>
               <a:t>Good evening….</a:t>
             </a:r>
+          </a:p>
+          <a:p>
+            <a:pPr marL="0" marR="0">
+              <a:lnSpc>
+                <a:spcPct val="107000"/>
+              </a:lnSpc>
+              <a:spcBef>
+                <a:spcPts val="0"/>
+              </a:spcBef>
+              <a:spcAft>
+                <a:spcPts val="800"/>
+              </a:spcAft>
+            </a:pPr>
             <a:endParaRPr lang="en-US" sz="1800" kern="100" dirty="0">
               <a:effectLst/>
               <a:latin typeface="Calibri" panose="020F0502020204030204" pitchFamily="34" charset="0"/>
@@ -591,6 +604,19 @@
               </a:rPr>
               <a:t>My name is Larry Haggerty, Data Analytics Student at Nashville Software School.</a:t>
             </a:r>
+          </a:p>
+          <a:p>
+            <a:pPr marL="0" marR="0">
+              <a:lnSpc>
+                <a:spcPct val="107000"/>
+              </a:lnSpc>
+              <a:spcBef>
+                <a:spcPts val="0"/>
+              </a:spcBef>
+              <a:spcAft>
+                <a:spcPts val="800"/>
+              </a:spcAft>
+            </a:pPr>
             <a:endParaRPr lang="en-US" sz="1800" kern="100" dirty="0">
               <a:effectLst/>
               <a:latin typeface="Calibri" panose="020F0502020204030204" pitchFamily="34" charset="0"/>
@@ -619,6 +645,19 @@
               </a:rPr>
               <a:t>My presentation this evening is titled “ENERGY to GDP per CAPITA Comparison”</a:t>
             </a:r>
+          </a:p>
+          <a:p>
+            <a:pPr marL="0" marR="0">
+              <a:lnSpc>
+                <a:spcPct val="107000"/>
+              </a:lnSpc>
+              <a:spcBef>
+                <a:spcPts val="0"/>
+              </a:spcBef>
+              <a:spcAft>
+                <a:spcPts val="800"/>
+              </a:spcAft>
+            </a:pPr>
             <a:endParaRPr lang="en-US" sz="1800" kern="100" dirty="0">
               <a:effectLst/>
               <a:latin typeface="Calibri" panose="020F0502020204030204" pitchFamily="34" charset="0"/>
@@ -757,7 +796,7 @@
                 <a:ea typeface="Calibri" panose="020F0502020204030204" pitchFamily="34" charset="0"/>
                 <a:cs typeface="Calibri" panose="020F0502020204030204" pitchFamily="34" charset="0"/>
               </a:rPr>
-              <a:t>Next I wanted to review the changes by PERCENT of CHANGE…..Once again using an average of all 50 states….</a:t>
+              <a:t>Next, I wanted to review the changes by PERCENT of CHANGE…..Once again using an average of all 50 states….</a:t>
             </a:r>
           </a:p>
           <a:p>
@@ -1708,7 +1747,7 @@
                 <a:ea typeface="Calibri" panose="020F0502020204030204" pitchFamily="34" charset="0"/>
                 <a:cs typeface="Calibri" panose="020F0502020204030204" pitchFamily="34" charset="0"/>
               </a:rPr>
-              <a:t>First I noticed a shift in the states listed….</a:t>
+              <a:t>First, I noticed a shift in the states listed….</a:t>
             </a:r>
             <a:endParaRPr lang="en-US" sz="1800" kern="100" dirty="0">
               <a:effectLst/>
@@ -2090,7 +2129,7 @@
                 <a:ea typeface="Calibri" panose="020F0502020204030204" pitchFamily="34" charset="0"/>
                 <a:cs typeface="Calibri" panose="020F0502020204030204" pitchFamily="34" charset="0"/>
               </a:rPr>
-              <a:t>My Key Thesis Starting this Project was that I would readily find a correlation between GDP per CAPITA to ENERGY CONSUMPTION…..My thought was that CONSUMPTION means Commerce means Money, and More Commerce would equal More Money….</a:t>
+              <a:t>My Key Thesis Starting this Project was that I would readily find a correlation between GDP per CAPITA to ENERGY CONSUMPTION…..My thought was that CONSUMPTION means Commerce which means Money, and More Commerce would equal More Money….and a higher GDP per Capita.</a:t>
             </a:r>
           </a:p>
           <a:p>
@@ -2213,7 +2252,7 @@
                 <a:ea typeface="Calibri" panose="020F0502020204030204" pitchFamily="34" charset="0"/>
                 <a:cs typeface="Calibri" panose="020F0502020204030204" pitchFamily="34" charset="0"/>
               </a:rPr>
-              <a:t>The dispersion observed in the charts for GDP per CAPITA to CONSUMPTION Indicates a lack of correlation.</a:t>
+              <a:t>The wide dispersion of values observed in the charts for GDP per CAPITA to CONSUMPTION Indicates a lack of correlation.</a:t>
             </a:r>
           </a:p>
           <a:p>
@@ -2601,7 +2640,7 @@
                 <a:ea typeface="Calibri" panose="020F0502020204030204" pitchFamily="34" charset="0"/>
                 <a:cs typeface="Calibri" panose="020F0502020204030204" pitchFamily="34" charset="0"/>
               </a:rPr>
-              <a:t>A Key Divers for Innovation is Funding….With this thought in mind I conducted a review of Government and Private Industry funding for Renewable Research &amp; Development. </a:t>
+              <a:t>A Key Driver for Innovation is Funding….With this thought in mind I conducted a review of Government and Private Industry funding for Renewable Research &amp; Development. </a:t>
             </a:r>
           </a:p>
           <a:p>
@@ -2652,7 +2691,7 @@
             </a:endParaRPr>
           </a:p>
           <a:p>
-            <a:pPr marL="342900" marR="0" lvl="0" indent="-342900">
+            <a:pPr marL="0" marR="0" lvl="0" indent="0">
               <a:lnSpc>
                 <a:spcPct val="107000"/>
               </a:lnSpc>
@@ -2663,7 +2702,7 @@
                 <a:spcPts val="0"/>
               </a:spcAft>
               <a:buFont typeface="Calibri" panose="020F0502020204030204" pitchFamily="34" charset="0"/>
-              <a:buChar char="-"/>
+              <a:buNone/>
             </a:pPr>
             <a:r>
               <a:rPr lang="en-US" sz="1800" kern="100" dirty="0">
@@ -2672,65 +2711,7 @@
                 <a:ea typeface="Calibri" panose="020F0502020204030204" pitchFamily="34" charset="0"/>
                 <a:cs typeface="Calibri" panose="020F0502020204030204" pitchFamily="34" charset="0"/>
               </a:rPr>
-              <a:t> </a:t>
-            </a:r>
-            <a:endParaRPr lang="en-US" sz="1800" kern="100" dirty="0">
-              <a:effectLst/>
-              <a:latin typeface="Calibri" panose="020F0502020204030204" pitchFamily="34" charset="0"/>
-              <a:ea typeface="Calibri" panose="020F0502020204030204" pitchFamily="34" charset="0"/>
-              <a:cs typeface="Times New Roman" panose="02020603050405020304" pitchFamily="18" charset="0"/>
-            </a:endParaRPr>
-          </a:p>
-          <a:p>
-            <a:pPr marL="342900" marR="0" lvl="0" indent="-342900">
-              <a:lnSpc>
-                <a:spcPct val="107000"/>
-              </a:lnSpc>
-              <a:spcBef>
-                <a:spcPts val="0"/>
-              </a:spcBef>
-              <a:spcAft>
-                <a:spcPts val="0"/>
-              </a:spcAft>
-              <a:buFont typeface="Calibri" panose="020F0502020204030204" pitchFamily="34" charset="0"/>
-              <a:buChar char="-"/>
-            </a:pPr>
-            <a:r>
-              <a:rPr lang="en-US" sz="1800" kern="100" dirty="0">
-                <a:effectLst/>
-                <a:latin typeface="Calibri" panose="020F0502020204030204" pitchFamily="34" charset="0"/>
-                <a:ea typeface="Calibri" panose="020F0502020204030204" pitchFamily="34" charset="0"/>
-                <a:cs typeface="Calibri" panose="020F0502020204030204" pitchFamily="34" charset="0"/>
-              </a:rPr>
-              <a:t>With the median investment from Private Industry is $1.2B while our Government’s contribution sits at $786M</a:t>
-            </a:r>
-            <a:endParaRPr lang="en-US" sz="1800" kern="100" dirty="0">
-              <a:effectLst/>
-              <a:latin typeface="Calibri" panose="020F0502020204030204" pitchFamily="34" charset="0"/>
-              <a:ea typeface="Calibri" panose="020F0502020204030204" pitchFamily="34" charset="0"/>
-              <a:cs typeface="Times New Roman" panose="02020603050405020304" pitchFamily="18" charset="0"/>
-            </a:endParaRPr>
-          </a:p>
-          <a:p>
-            <a:pPr marL="685800" marR="0">
-              <a:lnSpc>
-                <a:spcPct val="107000"/>
-              </a:lnSpc>
-              <a:spcBef>
-                <a:spcPts val="0"/>
-              </a:spcBef>
-              <a:spcAft>
-                <a:spcPts val="0"/>
-              </a:spcAft>
-            </a:pPr>
-            <a:r>
-              <a:rPr lang="en-US" sz="1800" kern="100" dirty="0">
-                <a:effectLst/>
-                <a:latin typeface="Calibri" panose="020F0502020204030204" pitchFamily="34" charset="0"/>
-                <a:ea typeface="Calibri" panose="020F0502020204030204" pitchFamily="34" charset="0"/>
-                <a:cs typeface="Calibri" panose="020F0502020204030204" pitchFamily="34" charset="0"/>
-              </a:rPr>
-              <a:t> </a:t>
+              <a:t>  </a:t>
             </a:r>
             <a:endParaRPr lang="en-US" sz="1800" kern="100" dirty="0">
               <a:effectLst/>
@@ -2762,6 +2743,76 @@
               </a:rPr>
               <a:t>2009 was the highest year for Private Industry investing $3B and 2012 was the highest year for the US Government investing $1.9B</a:t>
             </a:r>
+          </a:p>
+          <a:p>
+            <a:pPr marL="342900" marR="0" lvl="0" indent="-342900">
+              <a:lnSpc>
+                <a:spcPct val="107000"/>
+              </a:lnSpc>
+              <a:spcBef>
+                <a:spcPts val="0"/>
+              </a:spcBef>
+              <a:spcAft>
+                <a:spcPts val="800"/>
+              </a:spcAft>
+              <a:buFont typeface="Calibri" panose="020F0502020204030204" pitchFamily="34" charset="0"/>
+              <a:buChar char="-"/>
+            </a:pPr>
+            <a:endParaRPr lang="en-US" sz="1800" kern="100" dirty="0">
+              <a:effectLst/>
+              <a:latin typeface="Calibri" panose="020F0502020204030204" pitchFamily="34" charset="0"/>
+              <a:ea typeface="Calibri" panose="020F0502020204030204" pitchFamily="34" charset="0"/>
+              <a:cs typeface="Calibri" panose="020F0502020204030204" pitchFamily="34" charset="0"/>
+            </a:endParaRPr>
+          </a:p>
+          <a:p>
+            <a:pPr marL="342900" marR="0" lvl="0" indent="-342900" algn="l" defTabSz="914400" rtl="0" eaLnBrk="1" fontAlgn="auto" latinLnBrk="0" hangingPunct="1">
+              <a:lnSpc>
+                <a:spcPct val="107000"/>
+              </a:lnSpc>
+              <a:spcBef>
+                <a:spcPts val="0"/>
+              </a:spcBef>
+              <a:spcAft>
+                <a:spcPts val="800"/>
+              </a:spcAft>
+              <a:buClrTx/>
+              <a:buSzTx/>
+              <a:buFont typeface="Calibri" panose="020F0502020204030204" pitchFamily="34" charset="0"/>
+              <a:buChar char="-"/>
+              <a:tabLst/>
+              <a:defRPr/>
+            </a:pPr>
+            <a:r>
+              <a:rPr lang="en-US" sz="1800" kern="100" dirty="0">
+                <a:effectLst/>
+                <a:latin typeface="Calibri" panose="020F0502020204030204" pitchFamily="34" charset="0"/>
+                <a:ea typeface="Calibri" panose="020F0502020204030204" pitchFamily="34" charset="0"/>
+                <a:cs typeface="Calibri" panose="020F0502020204030204" pitchFamily="34" charset="0"/>
+              </a:rPr>
+              <a:t>With the median investment from Private Industry at $1.2B while our Government’s contribution sits at $786M</a:t>
+            </a:r>
+            <a:endParaRPr lang="en-US" sz="1800" kern="100" dirty="0">
+              <a:effectLst/>
+              <a:latin typeface="Calibri" panose="020F0502020204030204" pitchFamily="34" charset="0"/>
+              <a:ea typeface="Calibri" panose="020F0502020204030204" pitchFamily="34" charset="0"/>
+              <a:cs typeface="Times New Roman" panose="02020603050405020304" pitchFamily="18" charset="0"/>
+            </a:endParaRPr>
+          </a:p>
+          <a:p>
+            <a:pPr marL="0" marR="0" lvl="0" indent="0">
+              <a:lnSpc>
+                <a:spcPct val="107000"/>
+              </a:lnSpc>
+              <a:spcBef>
+                <a:spcPts val="0"/>
+              </a:spcBef>
+              <a:spcAft>
+                <a:spcPts val="800"/>
+              </a:spcAft>
+              <a:buFont typeface="Calibri" panose="020F0502020204030204" pitchFamily="34" charset="0"/>
+              <a:buNone/>
+            </a:pPr>
             <a:endParaRPr lang="en-US" sz="1800" kern="100" dirty="0">
               <a:effectLst/>
               <a:latin typeface="Calibri" panose="020F0502020204030204" pitchFamily="34" charset="0"/>
@@ -3707,8 +3758,21 @@
                 <a:ea typeface="Calibri" panose="020F0502020204030204" pitchFamily="34" charset="0"/>
                 <a:cs typeface="Calibri" panose="020F0502020204030204" pitchFamily="34" charset="0"/>
               </a:rPr>
-              <a:t>My analysis included datasets from Bureau of Economic Analysis, US Census Bureau, ENERGY Information Agency, &amp; International Information Agency and data for the years 1970, 1980, 1990, 2000, 2010, &amp; 2020.</a:t>
-            </a:r>
+              <a:t>My analysis included datasets from Bureau of Economic Analysis, US Census Bureau, ENERGY Information Agency, &amp; International Energy Agency and data for the years 1970, 1980, 1990, 2000, 2010, &amp; 2020.</a:t>
+            </a:r>
+          </a:p>
+          <a:p>
+            <a:pPr marL="0" marR="0">
+              <a:lnSpc>
+                <a:spcPct val="107000"/>
+              </a:lnSpc>
+              <a:spcBef>
+                <a:spcPts val="0"/>
+              </a:spcBef>
+              <a:spcAft>
+                <a:spcPts val="800"/>
+              </a:spcAft>
+            </a:pPr>
             <a:endParaRPr lang="en-US" sz="1800" kern="100" dirty="0">
               <a:effectLst/>
               <a:latin typeface="Calibri" panose="020F0502020204030204" pitchFamily="34" charset="0"/>
@@ -4142,7 +4206,7 @@
                 <a:ea typeface="Calibri" panose="020F0502020204030204" pitchFamily="34" charset="0"/>
                 <a:cs typeface="Calibri" panose="020F0502020204030204" pitchFamily="34" charset="0"/>
               </a:rPr>
-              <a:t>Utilizing this SCATTER CHART I was able to view the relative values for GDP per CAPITA based on the year and noticed:</a:t>
+              <a:t>Utilizing this SCATTER CHART I was able to view the relative values for GDP per CAPITA by year and noticed:</a:t>
             </a:r>
           </a:p>
           <a:p>
@@ -4873,7 +4937,7 @@
                 <a:ea typeface="Calibri" panose="020F0502020204030204" pitchFamily="34" charset="0"/>
                 <a:cs typeface="Calibri" panose="020F0502020204030204" pitchFamily="34" charset="0"/>
               </a:rPr>
-              <a:t>Next, I wanted to look at GDP across the country…..</a:t>
+              <a:t>Next, I wanted to look at GDP per CAPITA across the country…..</a:t>
             </a:r>
           </a:p>
           <a:p>
@@ -5017,7 +5081,7 @@
                 <a:ea typeface="Calibri" panose="020F0502020204030204" pitchFamily="34" charset="0"/>
                 <a:cs typeface="Calibri" panose="020F0502020204030204" pitchFamily="34" charset="0"/>
               </a:rPr>
-              <a:t>And from there I wanted to look and how the values changed over the years…</a:t>
+              <a:t>And from here I wanted to investigate how the values for ENERGY changed over the years…</a:t>
             </a:r>
             <a:endParaRPr lang="en-US" sz="1800" kern="100" dirty="0">
               <a:effectLst/>
@@ -5280,7 +5344,7 @@
                 <a:ea typeface="Calibri" panose="020F0502020204030204" pitchFamily="34" charset="0"/>
                 <a:cs typeface="Calibri" panose="020F0502020204030204" pitchFamily="34" charset="0"/>
               </a:rPr>
-              <a:t>1990vs2000 was the highest year for FOSSIL FUEL and a significant decline after 2000</a:t>
+              <a:t>1990vs2000 was the highest year for FOSSIL FUEL with a significant decline after 2000</a:t>
             </a:r>
             <a:endParaRPr lang="en-US" sz="1800" kern="100" dirty="0">
               <a:effectLst/>
@@ -5340,6 +5404,19 @@
               </a:rPr>
               <a:t>While RENEWABLES began their increase at the same time</a:t>
             </a:r>
+          </a:p>
+          <a:p>
+            <a:pPr marL="457200" marR="0">
+              <a:lnSpc>
+                <a:spcPct val="107000"/>
+              </a:lnSpc>
+              <a:spcBef>
+                <a:spcPts val="0"/>
+              </a:spcBef>
+              <a:spcAft>
+                <a:spcPts val="800"/>
+              </a:spcAft>
+            </a:pPr>
             <a:endParaRPr lang="en-US" sz="1800" kern="100" dirty="0">
               <a:effectLst/>
               <a:latin typeface="Calibri" panose="020F0502020204030204" pitchFamily="34" charset="0"/>
@@ -5368,6 +5445,19 @@
               </a:rPr>
               <a:t>Considering PRODUCTION….</a:t>
             </a:r>
+          </a:p>
+          <a:p>
+            <a:pPr marL="457200" marR="0">
+              <a:lnSpc>
+                <a:spcPct val="107000"/>
+              </a:lnSpc>
+              <a:spcBef>
+                <a:spcPts val="0"/>
+              </a:spcBef>
+              <a:spcAft>
+                <a:spcPts val="800"/>
+              </a:spcAft>
+            </a:pPr>
             <a:endParaRPr lang="en-US" sz="1800" kern="100" dirty="0">
               <a:effectLst/>
               <a:latin typeface="Calibri" panose="020F0502020204030204" pitchFamily="34" charset="0"/>
@@ -6894,7 +6984,7 @@
             <a:fld id="{5F02DCD1-2C6B-F948-9F72-3BB0CF3D512E}" type="datetime1">
               <a:rPr lang="en-US" smtClean="0"/>
               <a:pPr/>
-              <a:t>6/20/2023</a:t>
+              <a:t>6/21/2023</a:t>
             </a:fld>
             <a:endParaRPr lang="en-US" dirty="0"/>
           </a:p>
@@ -7779,7 +7869,7 @@
             <a:fld id="{C1583C39-01BF-7F43-854C-FBB4E9AB6B0C}" type="datetime1">
               <a:rPr lang="en-US" smtClean="0"/>
               <a:pPr/>
-              <a:t>6/20/2023</a:t>
+              <a:t>6/21/2023</a:t>
             </a:fld>
             <a:endParaRPr lang="en-US" dirty="0"/>
           </a:p>
@@ -8956,7 +9046,7 @@
             <a:fld id="{4B103E64-1627-9140-8127-1849FED275E1}" type="datetime1">
               <a:rPr lang="en-US" smtClean="0"/>
               <a:pPr/>
-              <a:t>6/20/2023</a:t>
+              <a:t>6/21/2023</a:t>
             </a:fld>
             <a:endParaRPr lang="en-US" dirty="0"/>
           </a:p>
@@ -11036,7 +11126,7 @@
             <a:fld id="{DD9C8446-696E-6942-B6C8-CC9CAD0B34E0}" type="datetime1">
               <a:rPr lang="en-US" smtClean="0"/>
               <a:pPr/>
-              <a:t>6/20/2023</a:t>
+              <a:t>6/21/2023</a:t>
             </a:fld>
             <a:endParaRPr lang="en-US" dirty="0"/>
           </a:p>
@@ -11754,7 +11844,7 @@
             <a:fld id="{F5592931-05C6-8543-8B6E-A8BD29BD5C2B}" type="datetime1">
               <a:rPr lang="en-US" smtClean="0"/>
               <a:pPr/>
-              <a:t>6/20/2023</a:t>
+              <a:t>6/21/2023</a:t>
             </a:fld>
             <a:endParaRPr lang="en-US" dirty="0"/>
           </a:p>
@@ -12982,7 +13072,7 @@
             <a:fld id="{7E7AB22C-8B7E-9B4A-8C65-396C3C874D86}" type="datetime1">
               <a:rPr lang="en-US" smtClean="0"/>
               <a:pPr/>
-              <a:t>6/20/2023</a:t>
+              <a:t>6/21/2023</a:t>
             </a:fld>
             <a:endParaRPr lang="en-US" dirty="0"/>
           </a:p>
@@ -13574,7 +13664,7 @@
             <a:fld id="{8CE9AC2A-20AD-8C48-B5EB-B5322BDBCDEE}" type="datetime1">
               <a:rPr lang="en-US" smtClean="0"/>
               <a:pPr/>
-              <a:t>6/20/2023</a:t>
+              <a:t>6/21/2023</a:t>
             </a:fld>
             <a:endParaRPr lang="en-US" dirty="0"/>
           </a:p>
@@ -14047,7 +14137,7 @@
             <a:fld id="{4CF75428-5BE0-934D-BB71-675F8E23A386}" type="datetime1">
               <a:rPr lang="en-US" smtClean="0"/>
               <a:pPr/>
-              <a:t>6/20/2023</a:t>
+              <a:t>6/21/2023</a:t>
             </a:fld>
             <a:endParaRPr lang="en-US" dirty="0"/>
           </a:p>
@@ -14897,7 +14987,7 @@
             <a:fld id="{9A85C5CA-AE29-AB4C-8F85-0373C72001D8}" type="datetime1">
               <a:rPr lang="en-US" smtClean="0"/>
               <a:pPr/>
-              <a:t>6/20/2023</a:t>
+              <a:t>6/21/2023</a:t>
             </a:fld>
             <a:endParaRPr lang="en-US" dirty="0"/>
           </a:p>
@@ -17122,7 +17212,7 @@
             <a:fld id="{75594855-01E8-5A4B-B2B8-E2ECEF879100}" type="datetime1">
               <a:rPr lang="en-US" smtClean="0"/>
               <a:pPr/>
-              <a:t>6/20/2023</a:t>
+              <a:t>6/21/2023</a:t>
             </a:fld>
             <a:endParaRPr lang="en-US" dirty="0"/>
           </a:p>
@@ -17391,7 +17481,7 @@
             <a:fld id="{B562DF68-3089-814D-8A14-C651FE91885E}" type="datetime1">
               <a:rPr lang="en-US" smtClean="0"/>
               <a:pPr/>
-              <a:t>6/20/2023</a:t>
+              <a:t>6/21/2023</a:t>
             </a:fld>
             <a:endParaRPr lang="en-US" dirty="0"/>
           </a:p>
@@ -18167,7 +18257,7 @@
                 <a:tabLst/>
                 <a:defRPr/>
               </a:pPr>
-              <a:t>6/20/2023</a:t>
+              <a:t>6/21/2023</a:t>
             </a:fld>
             <a:endParaRPr kumimoji="0" lang="en-US" sz="1200" b="0" i="0" u="none" strike="noStrike" kern="1200" cap="none" spc="0" normalizeH="0" baseline="0" noProof="0" dirty="0">
               <a:ln>
@@ -18870,7 +18960,7 @@
                 <a:tabLst/>
                 <a:defRPr/>
               </a:pPr>
-              <a:t>6/20/2023</a:t>
+              <a:t>6/21/2023</a:t>
             </a:fld>
             <a:endParaRPr kumimoji="0" lang="en-US" sz="1200" b="0" i="0" u="none" strike="noStrike" kern="1200" cap="none" spc="0" normalizeH="0" baseline="0" noProof="0" dirty="0">
               <a:ln>
@@ -19514,7 +19604,7 @@
                 <a:tabLst/>
                 <a:defRPr/>
               </a:pPr>
-              <a:t>6/20/2023</a:t>
+              <a:t>6/21/2023</a:t>
             </a:fld>
             <a:endParaRPr kumimoji="0" lang="en-US" sz="1200" b="0" i="0" u="none" strike="noStrike" kern="1200" cap="none" spc="0" normalizeH="0" baseline="0" noProof="0" dirty="0">
               <a:ln>
@@ -21383,7 +21473,7 @@
                 <a:tabLst/>
                 <a:defRPr/>
               </a:pPr>
-              <a:t>6/20/2023</a:t>
+              <a:t>6/21/2023</a:t>
             </a:fld>
             <a:endParaRPr kumimoji="0" lang="en-US" sz="1200" b="0" i="0" u="none" strike="noStrike" kern="1200" cap="none" spc="0" normalizeH="0" baseline="0" noProof="0" dirty="0">
               <a:ln>
@@ -22984,7 +23074,7 @@
                 <a:tabLst/>
                 <a:defRPr/>
               </a:pPr>
-              <a:t>6/20/2023</a:t>
+              <a:t>6/21/2023</a:t>
             </a:fld>
             <a:endParaRPr kumimoji="0" lang="en-US" sz="1200" b="0" i="0" u="none" strike="noStrike" kern="1200" cap="none" spc="0" normalizeH="0" baseline="0" noProof="0" dirty="0">
               <a:ln>
@@ -23629,7 +23719,7 @@
                 <a:tabLst/>
                 <a:defRPr/>
               </a:pPr>
-              <a:t>6/20/2023</a:t>
+              <a:t>6/21/2023</a:t>
             </a:fld>
             <a:endParaRPr kumimoji="0" lang="en-US" sz="1200" b="0" i="0" u="none" strike="noStrike" kern="1200" cap="none" spc="0" normalizeH="0" baseline="0" noProof="0" dirty="0">
               <a:ln>
@@ -24274,7 +24364,7 @@
                 <a:tabLst/>
                 <a:defRPr/>
               </a:pPr>
-              <a:t>6/20/2023</a:t>
+              <a:t>6/21/2023</a:t>
             </a:fld>
             <a:endParaRPr kumimoji="0" lang="en-US" sz="1200" b="0" i="0" u="none" strike="noStrike" kern="1200" cap="none" spc="0" normalizeH="0" baseline="0" noProof="0" dirty="0">
               <a:ln>
@@ -25253,7 +25343,7 @@
                 <a:tabLst/>
                 <a:defRPr/>
               </a:pPr>
-              <a:t>6/20/2023</a:t>
+              <a:t>6/21/2023</a:t>
             </a:fld>
             <a:endParaRPr kumimoji="0" lang="en-US" sz="1200" b="0" i="0" u="none" strike="noStrike" kern="1200" cap="none" spc="0" normalizeH="0" baseline="0" noProof="0" dirty="0">
               <a:ln>
@@ -26357,7 +26447,7 @@
             <a:fld id="{495D8227-9DE4-4D42-8C1B-E10C828BC634}" type="datetime1">
               <a:rPr lang="en-US" smtClean="0"/>
               <a:pPr/>
-              <a:t>6/20/2023</a:t>
+              <a:t>6/21/2023</a:t>
             </a:fld>
             <a:endParaRPr lang="en-US" dirty="0"/>
           </a:p>
@@ -26531,7 +26621,7 @@
                 <a:tabLst/>
                 <a:defRPr/>
               </a:pPr>
-              <a:t>6/20/2023</a:t>
+              <a:t>6/21/2023</a:t>
             </a:fld>
             <a:endParaRPr kumimoji="0" lang="en-US" sz="1200" b="0" i="0" u="none" strike="noStrike" kern="1200" cap="none" spc="0" normalizeH="0" baseline="0" noProof="0" dirty="0">
               <a:ln>
@@ -27521,7 +27611,7 @@
                 <a:tabLst/>
                 <a:defRPr/>
               </a:pPr>
-              <a:t>6/20/2023</a:t>
+              <a:t>6/21/2023</a:t>
             </a:fld>
             <a:endParaRPr kumimoji="0" lang="en-US" sz="1200" b="0" i="0" u="none" strike="noStrike" kern="1200" cap="none" spc="0" normalizeH="0" baseline="0" noProof="0" dirty="0">
               <a:ln>
@@ -29146,7 +29236,7 @@
             <a:fld id="{7FA0C2EE-8499-394A-A22C-DABDB4752AEE}" type="datetime1">
               <a:rPr lang="en-US" smtClean="0"/>
               <a:pPr/>
-              <a:t>6/20/2023</a:t>
+              <a:t>6/21/2023</a:t>
             </a:fld>
             <a:endParaRPr lang="en-US" dirty="0"/>
           </a:p>
@@ -29770,7 +29860,7 @@
             <a:fld id="{0B931EDA-BCF8-BB4B-B4D1-2CFE062FA080}" type="datetime1">
               <a:rPr lang="en-US" smtClean="0"/>
               <a:pPr/>
-              <a:t>6/20/2023</a:t>
+              <a:t>6/21/2023</a:t>
             </a:fld>
             <a:endParaRPr lang="en-US" dirty="0"/>
           </a:p>
@@ -30015,7 +30105,7 @@
             <a:fld id="{E1707CF3-9BC4-A745-ACDA-A73543D800FE}" type="datetime1">
               <a:rPr lang="en-US" smtClean="0"/>
               <a:pPr/>
-              <a:t>6/20/2023</a:t>
+              <a:t>6/21/2023</a:t>
             </a:fld>
             <a:endParaRPr lang="en-US" dirty="0"/>
           </a:p>
@@ -30219,7 +30309,7 @@
             </a:pPr>
             <a:r>
               <a:rPr lang="en-US" dirty="0"/>
-              <a:t>Analysis utilized energy &amp; economic related data sets from the Bureau of Economic Analysis, US Census Bureau, Energy Information Agency, &amp; International Information Agency.</a:t>
+              <a:t>Analysis utilized energy &amp; economic related data sets from the Bureau of Economic Analysis, US Census Bureau, Energy Information Agency, &amp; International Energy Agency.</a:t>
             </a:r>
           </a:p>
           <a:p>
@@ -30432,7 +30522,7 @@
                 <a:tabLst/>
                 <a:defRPr/>
               </a:pPr>
-              <a:t>6/20/2023</a:t>
+              <a:t>6/21/2023</a:t>
             </a:fld>
             <a:endParaRPr kumimoji="0" lang="en-US" sz="1200" b="0" i="0" u="none" strike="noStrike" kern="1200" cap="none" spc="0" normalizeH="0" baseline="0" noProof="0" dirty="0">
               <a:ln>
@@ -30776,7 +30866,7 @@
                 <a:tabLst/>
                 <a:defRPr/>
               </a:pPr>
-              <a:t>6/20/2023</a:t>
+              <a:t>6/21/2023</a:t>
             </a:fld>
             <a:endParaRPr kumimoji="0" lang="en-US" sz="1200" b="0" i="0" u="none" strike="noStrike" kern="1200" cap="none" spc="0" normalizeH="0" baseline="0" noProof="0" dirty="0">
               <a:ln>
@@ -32607,7 +32697,7 @@
                 <a:tabLst/>
                 <a:defRPr/>
               </a:pPr>
-              <a:t>6/20/2023</a:t>
+              <a:t>6/21/2023</a:t>
             </a:fld>
             <a:endParaRPr kumimoji="0" lang="en-US" sz="1200" b="0" i="0" u="none" strike="noStrike" kern="1200" cap="none" spc="0" normalizeH="0" baseline="0" noProof="0" dirty="0">
               <a:ln>
@@ -33826,7 +33916,7 @@
                 <a:tabLst/>
                 <a:defRPr/>
               </a:pPr>
-              <a:t>6/20/2023</a:t>
+              <a:t>6/21/2023</a:t>
             </a:fld>
             <a:endParaRPr kumimoji="0" lang="en-US" sz="1200" b="0" i="0" u="none" strike="noStrike" kern="1200" cap="none" spc="0" normalizeH="0" baseline="0" noProof="0" dirty="0">
               <a:ln>
@@ -34364,7 +34454,7 @@
                 <a:tabLst/>
                 <a:defRPr/>
               </a:pPr>
-              <a:t>6/20/2023</a:t>
+              <a:t>6/21/2023</a:t>
             </a:fld>
             <a:endParaRPr kumimoji="0" lang="en-US" sz="1200" b="0" i="0" u="none" strike="noStrike" kern="1200" cap="none" spc="0" normalizeH="0" baseline="0" noProof="0" dirty="0">
               <a:ln>
@@ -36000,15 +36090,6 @@
 </file>
 
 <file path=customXml/item1.xml><?xml version="1.0" encoding="utf-8"?>
-<?mso-contentType ?>
-<FormTemplates xmlns="http://schemas.microsoft.com/sharepoint/v3/contenttype/forms">
-  <Display>DocumentLibraryForm</Display>
-  <Edit>DocumentLibraryForm</Edit>
-  <New>DocumentLibraryForm</New>
-</FormTemplates>
-</file>
-
-<file path=customXml/item2.xml><?xml version="1.0" encoding="utf-8"?>
 <p:properties xmlns:p="http://schemas.microsoft.com/office/2006/metadata/properties" xmlns:xsi="http://www.w3.org/2001/XMLSchema-instance" xmlns:pc="http://schemas.microsoft.com/office/infopath/2007/PartnerControls">
   <documentManagement>
     <_ip_UnifiedCompliancePolicyUIAction xmlns="http://schemas.microsoft.com/sharepoint/v3" xsi:nil="true"/>
@@ -36025,6 +36106,15 @@
     <MediaServiceKeyPoints xmlns="71af3243-3dd4-4a8d-8c0d-dd76da1f02a5" xsi:nil="true"/>
   </documentManagement>
 </p:properties>
+</file>
+
+<file path=customXml/item2.xml><?xml version="1.0" encoding="utf-8"?>
+<?mso-contentType ?>
+<FormTemplates xmlns="http://schemas.microsoft.com/sharepoint/v3/contenttype/forms">
+  <Display>DocumentLibraryForm</Display>
+  <Edit>DocumentLibraryForm</Edit>
+  <New>DocumentLibraryForm</New>
+</FormTemplates>
 </file>
 
 <file path=customXml/item3.xml><?xml version="1.0" encoding="utf-8"?>
@@ -36310,14 +36400,6 @@
 </file>
 
 <file path=customXml/itemProps1.xml><?xml version="1.0" encoding="utf-8"?>
-<ds:datastoreItem xmlns:ds="http://schemas.openxmlformats.org/officeDocument/2006/customXml" ds:itemID="{85334180-0405-413B-834A-44FA9E05ADB7}">
-  <ds:schemaRefs>
-    <ds:schemaRef ds:uri="http://schemas.microsoft.com/sharepoint/v3/contenttype/forms"/>
-  </ds:schemaRefs>
-</ds:datastoreItem>
-</file>
-
-<file path=customXml/itemProps2.xml><?xml version="1.0" encoding="utf-8"?>
 <ds:datastoreItem xmlns:ds="http://schemas.openxmlformats.org/officeDocument/2006/customXml" ds:itemID="{4D5BAB77-79E1-4739-AA51-10C9079186D6}">
   <ds:schemaRefs>
     <ds:schemaRef ds:uri="http://schemas.microsoft.com/office/2006/documentManagement/types"/>
@@ -36332,6 +36414,14 @@
     <ds:schemaRef ds:uri="http://schemas.microsoft.com/sharepoint/v3"/>
     <ds:schemaRef ds:uri="http://schemas.microsoft.com/office/2006/metadata/properties"/>
     <ds:schemaRef ds:uri="http://purl.org/dc/dcmitype/"/>
+  </ds:schemaRefs>
+</ds:datastoreItem>
+</file>
+
+<file path=customXml/itemProps2.xml><?xml version="1.0" encoding="utf-8"?>
+<ds:datastoreItem xmlns:ds="http://schemas.openxmlformats.org/officeDocument/2006/customXml" ds:itemID="{85334180-0405-413B-834A-44FA9E05ADB7}">
+  <ds:schemaRefs>
+    <ds:schemaRef ds:uri="http://schemas.microsoft.com/sharepoint/v3/contenttype/forms"/>
   </ds:schemaRefs>
 </ds:datastoreItem>
 </file>

</xml_diff>

<commit_message>
22jun final - notes updated
</commit_message>
<xml_diff>
--- a/presentation/haggerty_energy_gdp_1.pptx
+++ b/presentation/haggerty_energy_gdp_1.pptx
@@ -232,7 +232,7 @@
           <a:p>
             <a:fld id="{7487ADD9-2083-264C-A652-8D52D02F7E72}" type="datetimeFigureOut">
               <a:rPr lang="en-US" smtClean="0"/>
-              <a:t>6/21/2023</a:t>
+              <a:t>6/22/2023</a:t>
             </a:fld>
             <a:endParaRPr lang="en-US" dirty="0"/>
           </a:p>
@@ -1704,7 +1704,7 @@
                 <a:ea typeface="Calibri" panose="020F0502020204030204" pitchFamily="34" charset="0"/>
                 <a:cs typeface="Calibri" panose="020F0502020204030204" pitchFamily="34" charset="0"/>
               </a:rPr>
-              <a:t>Now moving to PERCENT CHANGE for the TOP 5 &amp; BOTTOM 5for PRODUCTION….</a:t>
+              <a:t>Now moving to PERCENT CHANGE for the TOP 5 &amp; BOTTOM 5 for CONSUMPTION….</a:t>
             </a:r>
           </a:p>
           <a:p>
@@ -1719,36 +1719,6 @@
                 <a:spcPts val="800"/>
               </a:spcAft>
             </a:pPr>
-            <a:endParaRPr lang="en-US" sz="1800" kern="100" dirty="0">
-              <a:effectLst/>
-              <a:latin typeface="Calibri" panose="020F0502020204030204" pitchFamily="34" charset="0"/>
-              <a:ea typeface="Calibri" panose="020F0502020204030204" pitchFamily="34" charset="0"/>
-              <a:cs typeface="Times New Roman" panose="02020603050405020304" pitchFamily="18" charset="0"/>
-            </a:endParaRPr>
-          </a:p>
-          <a:p>
-            <a:pPr marL="342900" marR="0" lvl="0" indent="-342900">
-              <a:lnSpc>
-                <a:spcPct val="107000"/>
-              </a:lnSpc>
-              <a:spcBef>
-                <a:spcPts val="0"/>
-              </a:spcBef>
-              <a:spcAft>
-                <a:spcPts val="0"/>
-              </a:spcAft>
-              <a:buFont typeface="Calibri" panose="020F0502020204030204" pitchFamily="34" charset="0"/>
-              <a:buChar char="-"/>
-            </a:pPr>
-            <a:r>
-              <a:rPr lang="en-US" sz="1800" kern="100" dirty="0">
-                <a:effectLst/>
-                <a:latin typeface="Calibri" panose="020F0502020204030204" pitchFamily="34" charset="0"/>
-                <a:ea typeface="Calibri" panose="020F0502020204030204" pitchFamily="34" charset="0"/>
-                <a:cs typeface="Calibri" panose="020F0502020204030204" pitchFamily="34" charset="0"/>
-              </a:rPr>
-              <a:t>First, I noticed a shift in the states listed….</a:t>
-            </a:r>
             <a:endParaRPr lang="en-US" sz="1800" kern="100" dirty="0">
               <a:effectLst/>
               <a:latin typeface="Calibri" panose="020F0502020204030204" pitchFamily="34" charset="0"/>
@@ -2017,7 +1987,7 @@
                 <a:ea typeface="Calibri" panose="020F0502020204030204" pitchFamily="34" charset="0"/>
                 <a:cs typeface="Calibri" panose="020F0502020204030204" pitchFamily="34" charset="0"/>
               </a:rPr>
-              <a:t>- This shift remains consistent for Percent of Change in RENEWABLES PRODUCTION</a:t>
+              <a:t>- This shift remains consistent for Percent of Change in PRODUCTION</a:t>
             </a:r>
             <a:endParaRPr lang="en-US" sz="1200" kern="100" dirty="0">
               <a:effectLst/>
@@ -2293,7 +2263,7 @@
                 <a:ea typeface="Calibri" panose="020F0502020204030204" pitchFamily="34" charset="0"/>
                 <a:cs typeface="Calibri" panose="020F0502020204030204" pitchFamily="34" charset="0"/>
               </a:rPr>
-              <a:t>Using the Data, I made the same comparison using Population to CONSUMPTION and realized that this a much stronger correlation than GDP per CAPITA correlation.</a:t>
+              <a:t>Leveraging my Datasets, I made the same comparison using Population to CONSUMPTION and realized that this displays a much stronger correlation than GDP per CAPITA.</a:t>
             </a:r>
           </a:p>
           <a:p>
@@ -3020,7 +2990,7 @@
                 <a:ea typeface="Calibri" panose="020F0502020204030204" pitchFamily="34" charset="0"/>
                 <a:cs typeface="Calibri" panose="020F0502020204030204" pitchFamily="34" charset="0"/>
               </a:rPr>
-              <a:t>Overall, we can expect approximately 16.6M (BN Btu) from RENEWABLE ENERGY sources</a:t>
+              <a:t>Overall, we can expect approximately 16.6M (BN Btu) from RENEWABLE ENERGY sources from 2030 - 2050</a:t>
             </a:r>
             <a:endParaRPr lang="en-US" sz="1800" kern="100" dirty="0">
               <a:effectLst/>
@@ -3175,7 +3145,25 @@
                 <a:ea typeface="Calibri" panose="020F0502020204030204" pitchFamily="34" charset="0"/>
                 <a:cs typeface="Calibri" panose="020F0502020204030204" pitchFamily="34" charset="0"/>
               </a:rPr>
-              <a:t>Looking at our current Stated Policies” for ENERGY we can expect our use of RENEWABLES to grow to 35% of our Total ENERGY Supply</a:t>
+              <a:t>Looking at our </a:t>
+            </a:r>
+            <a:r>
+              <a:rPr lang="en-US" sz="1800" kern="100">
+                <a:effectLst/>
+                <a:latin typeface="Calibri" panose="020F0502020204030204" pitchFamily="34" charset="0"/>
+                <a:ea typeface="Calibri" panose="020F0502020204030204" pitchFamily="34" charset="0"/>
+                <a:cs typeface="Calibri" panose="020F0502020204030204" pitchFamily="34" charset="0"/>
+              </a:rPr>
+              <a:t>current “Stated </a:t>
+            </a:r>
+            <a:r>
+              <a:rPr lang="en-US" sz="1800" kern="100" dirty="0">
+                <a:effectLst/>
+                <a:latin typeface="Calibri" panose="020F0502020204030204" pitchFamily="34" charset="0"/>
+                <a:ea typeface="Calibri" panose="020F0502020204030204" pitchFamily="34" charset="0"/>
+                <a:cs typeface="Calibri" panose="020F0502020204030204" pitchFamily="34" charset="0"/>
+              </a:rPr>
+              <a:t>Policies” for ENERGY we can expect our use of RENEWABLES to grow to 35% of our Total ENERGY Supply</a:t>
             </a:r>
             <a:endParaRPr lang="en-US" sz="1800" kern="100" dirty="0">
               <a:effectLst/>
@@ -3605,7 +3593,7 @@
                 <a:ea typeface="Calibri" panose="020F0502020204030204" pitchFamily="34" charset="0"/>
                 <a:cs typeface="Calibri" panose="020F0502020204030204" pitchFamily="34" charset="0"/>
               </a:rPr>
-              <a:t>The primary goal of this project was to compare ENERGY CONSUMPTION and PRODUCTION to GDP per CAPITA at the state and national level while understanding the nation’s shift away from FOSSIL FUELS and if / how this relates to the nation’s leading fiscal metric. </a:t>
+              <a:t>The primary goal of this project was to compare ENERGY CONSUMPTION and PRODUCTION to GDP per CAPITA at the state and national level while understanding the nation’s shift away from FOSSIL FUELS and how this relates to the nation’s leading fiscal metric. </a:t>
             </a:r>
           </a:p>
           <a:p>
@@ -4206,7 +4194,7 @@
                 <a:ea typeface="Calibri" panose="020F0502020204030204" pitchFamily="34" charset="0"/>
                 <a:cs typeface="Calibri" panose="020F0502020204030204" pitchFamily="34" charset="0"/>
               </a:rPr>
-              <a:t>Utilizing this SCATTER CHART I was able to view the relative values for GDP per CAPITA by year and noticed:</a:t>
+              <a:t>Utilizing this SCATTER CHART I was able to view the relative values for GDP per CAPITA  and ENERGY by year and noticed:</a:t>
             </a:r>
           </a:p>
           <a:p>
@@ -4249,7 +4237,7 @@
                 <a:ea typeface="Calibri" panose="020F0502020204030204" pitchFamily="34" charset="0"/>
                 <a:cs typeface="Calibri" panose="020F0502020204030204" pitchFamily="34" charset="0"/>
               </a:rPr>
-              <a:t>Up to 5M (BN Btu) for CONSUMPTION and PRODUCTION covered most of the states</a:t>
+              <a:t>Up to 5M (BN Btu) was the highest value for CONSUMPTION and PRODUCTION across most of the states</a:t>
             </a:r>
             <a:endParaRPr lang="en-US" sz="1800" kern="100" dirty="0">
               <a:effectLst/>
@@ -4670,7 +4658,7 @@
                 <a:ea typeface="Calibri" panose="020F0502020204030204" pitchFamily="34" charset="0"/>
                 <a:cs typeface="Calibri" panose="020F0502020204030204" pitchFamily="34" charset="0"/>
               </a:rPr>
-              <a:t>Additionally, I noted most states with less than 200K (BN Btu) across all years considered. </a:t>
+              <a:t>Additionally, I noted most states sat at less than 200K (BN Btu) across all years considered for RENEWABLES. </a:t>
             </a:r>
             <a:endParaRPr lang="en-US" sz="1800" kern="100" dirty="0">
               <a:effectLst/>
@@ -4782,7 +4770,48 @@
                 <a:ea typeface="Calibri" panose="020F0502020204030204" pitchFamily="34" charset="0"/>
                 <a:cs typeface="Calibri" panose="020F0502020204030204" pitchFamily="34" charset="0"/>
               </a:rPr>
-              <a:t>Taking this a step further I wanted to look compare the MIX of ENERGY to GDP per CAPITA….</a:t>
+              <a:t>Taking this a step further I wanted to compare the MIX of ENERGY to GDP per CAPITA….</a:t>
+            </a:r>
+          </a:p>
+          <a:p>
+            <a:pPr marL="0" marR="0">
+              <a:lnSpc>
+                <a:spcPct val="107000"/>
+              </a:lnSpc>
+              <a:spcBef>
+                <a:spcPts val="0"/>
+              </a:spcBef>
+              <a:spcAft>
+                <a:spcPts val="800"/>
+              </a:spcAft>
+            </a:pPr>
+            <a:endParaRPr lang="en-US" sz="1800" kern="100" dirty="0">
+              <a:effectLst/>
+              <a:latin typeface="Calibri" panose="020F0502020204030204" pitchFamily="34" charset="0"/>
+              <a:ea typeface="Calibri" panose="020F0502020204030204" pitchFamily="34" charset="0"/>
+              <a:cs typeface="Calibri" panose="020F0502020204030204" pitchFamily="34" charset="0"/>
+            </a:endParaRPr>
+          </a:p>
+          <a:p>
+            <a:pPr marL="0" marR="0">
+              <a:lnSpc>
+                <a:spcPct val="107000"/>
+              </a:lnSpc>
+              <a:spcBef>
+                <a:spcPts val="0"/>
+              </a:spcBef>
+              <a:spcAft>
+                <a:spcPts val="800"/>
+              </a:spcAft>
+            </a:pPr>
+            <a:r>
+              <a:rPr lang="en-US" sz="1800" kern="100" dirty="0">
+                <a:effectLst/>
+                <a:latin typeface="Calibri" panose="020F0502020204030204" pitchFamily="34" charset="0"/>
+                <a:ea typeface="Calibri" panose="020F0502020204030204" pitchFamily="34" charset="0"/>
+                <a:cs typeface="Calibri" panose="020F0502020204030204" pitchFamily="34" charset="0"/>
+              </a:rPr>
+              <a:t>-       No Surprises Here…</a:t>
             </a:r>
           </a:p>
           <a:p>
@@ -6984,7 +7013,7 @@
             <a:fld id="{5F02DCD1-2C6B-F948-9F72-3BB0CF3D512E}" type="datetime1">
               <a:rPr lang="en-US" smtClean="0"/>
               <a:pPr/>
-              <a:t>6/21/2023</a:t>
+              <a:t>6/22/2023</a:t>
             </a:fld>
             <a:endParaRPr lang="en-US" dirty="0"/>
           </a:p>
@@ -7869,7 +7898,7 @@
             <a:fld id="{C1583C39-01BF-7F43-854C-FBB4E9AB6B0C}" type="datetime1">
               <a:rPr lang="en-US" smtClean="0"/>
               <a:pPr/>
-              <a:t>6/21/2023</a:t>
+              <a:t>6/22/2023</a:t>
             </a:fld>
             <a:endParaRPr lang="en-US" dirty="0"/>
           </a:p>
@@ -9046,7 +9075,7 @@
             <a:fld id="{4B103E64-1627-9140-8127-1849FED275E1}" type="datetime1">
               <a:rPr lang="en-US" smtClean="0"/>
               <a:pPr/>
-              <a:t>6/21/2023</a:t>
+              <a:t>6/22/2023</a:t>
             </a:fld>
             <a:endParaRPr lang="en-US" dirty="0"/>
           </a:p>
@@ -11126,7 +11155,7 @@
             <a:fld id="{DD9C8446-696E-6942-B6C8-CC9CAD0B34E0}" type="datetime1">
               <a:rPr lang="en-US" smtClean="0"/>
               <a:pPr/>
-              <a:t>6/21/2023</a:t>
+              <a:t>6/22/2023</a:t>
             </a:fld>
             <a:endParaRPr lang="en-US" dirty="0"/>
           </a:p>
@@ -11844,7 +11873,7 @@
             <a:fld id="{F5592931-05C6-8543-8B6E-A8BD29BD5C2B}" type="datetime1">
               <a:rPr lang="en-US" smtClean="0"/>
               <a:pPr/>
-              <a:t>6/21/2023</a:t>
+              <a:t>6/22/2023</a:t>
             </a:fld>
             <a:endParaRPr lang="en-US" dirty="0"/>
           </a:p>
@@ -13072,7 +13101,7 @@
             <a:fld id="{7E7AB22C-8B7E-9B4A-8C65-396C3C874D86}" type="datetime1">
               <a:rPr lang="en-US" smtClean="0"/>
               <a:pPr/>
-              <a:t>6/21/2023</a:t>
+              <a:t>6/22/2023</a:t>
             </a:fld>
             <a:endParaRPr lang="en-US" dirty="0"/>
           </a:p>
@@ -13664,7 +13693,7 @@
             <a:fld id="{8CE9AC2A-20AD-8C48-B5EB-B5322BDBCDEE}" type="datetime1">
               <a:rPr lang="en-US" smtClean="0"/>
               <a:pPr/>
-              <a:t>6/21/2023</a:t>
+              <a:t>6/22/2023</a:t>
             </a:fld>
             <a:endParaRPr lang="en-US" dirty="0"/>
           </a:p>
@@ -14137,7 +14166,7 @@
             <a:fld id="{4CF75428-5BE0-934D-BB71-675F8E23A386}" type="datetime1">
               <a:rPr lang="en-US" smtClean="0"/>
               <a:pPr/>
-              <a:t>6/21/2023</a:t>
+              <a:t>6/22/2023</a:t>
             </a:fld>
             <a:endParaRPr lang="en-US" dirty="0"/>
           </a:p>
@@ -14987,7 +15016,7 @@
             <a:fld id="{9A85C5CA-AE29-AB4C-8F85-0373C72001D8}" type="datetime1">
               <a:rPr lang="en-US" smtClean="0"/>
               <a:pPr/>
-              <a:t>6/21/2023</a:t>
+              <a:t>6/22/2023</a:t>
             </a:fld>
             <a:endParaRPr lang="en-US" dirty="0"/>
           </a:p>
@@ -17212,7 +17241,7 @@
             <a:fld id="{75594855-01E8-5A4B-B2B8-E2ECEF879100}" type="datetime1">
               <a:rPr lang="en-US" smtClean="0"/>
               <a:pPr/>
-              <a:t>6/21/2023</a:t>
+              <a:t>6/22/2023</a:t>
             </a:fld>
             <a:endParaRPr lang="en-US" dirty="0"/>
           </a:p>
@@ -17481,7 +17510,7 @@
             <a:fld id="{B562DF68-3089-814D-8A14-C651FE91885E}" type="datetime1">
               <a:rPr lang="en-US" smtClean="0"/>
               <a:pPr/>
-              <a:t>6/21/2023</a:t>
+              <a:t>6/22/2023</a:t>
             </a:fld>
             <a:endParaRPr lang="en-US" dirty="0"/>
           </a:p>
@@ -18257,7 +18286,7 @@
                 <a:tabLst/>
                 <a:defRPr/>
               </a:pPr>
-              <a:t>6/21/2023</a:t>
+              <a:t>6/22/2023</a:t>
             </a:fld>
             <a:endParaRPr kumimoji="0" lang="en-US" sz="1200" b="0" i="0" u="none" strike="noStrike" kern="1200" cap="none" spc="0" normalizeH="0" baseline="0" noProof="0" dirty="0">
               <a:ln>
@@ -18960,7 +18989,7 @@
                 <a:tabLst/>
                 <a:defRPr/>
               </a:pPr>
-              <a:t>6/21/2023</a:t>
+              <a:t>6/22/2023</a:t>
             </a:fld>
             <a:endParaRPr kumimoji="0" lang="en-US" sz="1200" b="0" i="0" u="none" strike="noStrike" kern="1200" cap="none" spc="0" normalizeH="0" baseline="0" noProof="0" dirty="0">
               <a:ln>
@@ -19604,7 +19633,7 @@
                 <a:tabLst/>
                 <a:defRPr/>
               </a:pPr>
-              <a:t>6/21/2023</a:t>
+              <a:t>6/22/2023</a:t>
             </a:fld>
             <a:endParaRPr kumimoji="0" lang="en-US" sz="1200" b="0" i="0" u="none" strike="noStrike" kern="1200" cap="none" spc="0" normalizeH="0" baseline="0" noProof="0" dirty="0">
               <a:ln>
@@ -21473,7 +21502,7 @@
                 <a:tabLst/>
                 <a:defRPr/>
               </a:pPr>
-              <a:t>6/21/2023</a:t>
+              <a:t>6/22/2023</a:t>
             </a:fld>
             <a:endParaRPr kumimoji="0" lang="en-US" sz="1200" b="0" i="0" u="none" strike="noStrike" kern="1200" cap="none" spc="0" normalizeH="0" baseline="0" noProof="0" dirty="0">
               <a:ln>
@@ -23074,7 +23103,7 @@
                 <a:tabLst/>
                 <a:defRPr/>
               </a:pPr>
-              <a:t>6/21/2023</a:t>
+              <a:t>6/22/2023</a:t>
             </a:fld>
             <a:endParaRPr kumimoji="0" lang="en-US" sz="1200" b="0" i="0" u="none" strike="noStrike" kern="1200" cap="none" spc="0" normalizeH="0" baseline="0" noProof="0" dirty="0">
               <a:ln>
@@ -23719,7 +23748,7 @@
                 <a:tabLst/>
                 <a:defRPr/>
               </a:pPr>
-              <a:t>6/21/2023</a:t>
+              <a:t>6/22/2023</a:t>
             </a:fld>
             <a:endParaRPr kumimoji="0" lang="en-US" sz="1200" b="0" i="0" u="none" strike="noStrike" kern="1200" cap="none" spc="0" normalizeH="0" baseline="0" noProof="0" dirty="0">
               <a:ln>
@@ -24364,7 +24393,7 @@
                 <a:tabLst/>
                 <a:defRPr/>
               </a:pPr>
-              <a:t>6/21/2023</a:t>
+              <a:t>6/22/2023</a:t>
             </a:fld>
             <a:endParaRPr kumimoji="0" lang="en-US" sz="1200" b="0" i="0" u="none" strike="noStrike" kern="1200" cap="none" spc="0" normalizeH="0" baseline="0" noProof="0" dirty="0">
               <a:ln>
@@ -25343,7 +25372,7 @@
                 <a:tabLst/>
                 <a:defRPr/>
               </a:pPr>
-              <a:t>6/21/2023</a:t>
+              <a:t>6/22/2023</a:t>
             </a:fld>
             <a:endParaRPr kumimoji="0" lang="en-US" sz="1200" b="0" i="0" u="none" strike="noStrike" kern="1200" cap="none" spc="0" normalizeH="0" baseline="0" noProof="0" dirty="0">
               <a:ln>
@@ -26447,7 +26476,7 @@
             <a:fld id="{495D8227-9DE4-4D42-8C1B-E10C828BC634}" type="datetime1">
               <a:rPr lang="en-US" smtClean="0"/>
               <a:pPr/>
-              <a:t>6/21/2023</a:t>
+              <a:t>6/22/2023</a:t>
             </a:fld>
             <a:endParaRPr lang="en-US" dirty="0"/>
           </a:p>
@@ -26621,7 +26650,7 @@
                 <a:tabLst/>
                 <a:defRPr/>
               </a:pPr>
-              <a:t>6/21/2023</a:t>
+              <a:t>6/22/2023</a:t>
             </a:fld>
             <a:endParaRPr kumimoji="0" lang="en-US" sz="1200" b="0" i="0" u="none" strike="noStrike" kern="1200" cap="none" spc="0" normalizeH="0" baseline="0" noProof="0" dirty="0">
               <a:ln>
@@ -27611,7 +27640,7 @@
                 <a:tabLst/>
                 <a:defRPr/>
               </a:pPr>
-              <a:t>6/21/2023</a:t>
+              <a:t>6/22/2023</a:t>
             </a:fld>
             <a:endParaRPr kumimoji="0" lang="en-US" sz="1200" b="0" i="0" u="none" strike="noStrike" kern="1200" cap="none" spc="0" normalizeH="0" baseline="0" noProof="0" dirty="0">
               <a:ln>
@@ -29236,7 +29265,7 @@
             <a:fld id="{7FA0C2EE-8499-394A-A22C-DABDB4752AEE}" type="datetime1">
               <a:rPr lang="en-US" smtClean="0"/>
               <a:pPr/>
-              <a:t>6/21/2023</a:t>
+              <a:t>6/22/2023</a:t>
             </a:fld>
             <a:endParaRPr lang="en-US" dirty="0"/>
           </a:p>
@@ -29860,7 +29889,7 @@
             <a:fld id="{0B931EDA-BCF8-BB4B-B4D1-2CFE062FA080}" type="datetime1">
               <a:rPr lang="en-US" smtClean="0"/>
               <a:pPr/>
-              <a:t>6/21/2023</a:t>
+              <a:t>6/22/2023</a:t>
             </a:fld>
             <a:endParaRPr lang="en-US" dirty="0"/>
           </a:p>
@@ -30105,7 +30134,7 @@
             <a:fld id="{E1707CF3-9BC4-A745-ACDA-A73543D800FE}" type="datetime1">
               <a:rPr lang="en-US" smtClean="0"/>
               <a:pPr/>
-              <a:t>6/21/2023</a:t>
+              <a:t>6/22/2023</a:t>
             </a:fld>
             <a:endParaRPr lang="en-US" dirty="0"/>
           </a:p>
@@ -30522,7 +30551,7 @@
                 <a:tabLst/>
                 <a:defRPr/>
               </a:pPr>
-              <a:t>6/21/2023</a:t>
+              <a:t>6/22/2023</a:t>
             </a:fld>
             <a:endParaRPr kumimoji="0" lang="en-US" sz="1200" b="0" i="0" u="none" strike="noStrike" kern="1200" cap="none" spc="0" normalizeH="0" baseline="0" noProof="0" dirty="0">
               <a:ln>
@@ -30866,7 +30895,7 @@
                 <a:tabLst/>
                 <a:defRPr/>
               </a:pPr>
-              <a:t>6/21/2023</a:t>
+              <a:t>6/22/2023</a:t>
             </a:fld>
             <a:endParaRPr kumimoji="0" lang="en-US" sz="1200" b="0" i="0" u="none" strike="noStrike" kern="1200" cap="none" spc="0" normalizeH="0" baseline="0" noProof="0" dirty="0">
               <a:ln>
@@ -32697,7 +32726,7 @@
                 <a:tabLst/>
                 <a:defRPr/>
               </a:pPr>
-              <a:t>6/21/2023</a:t>
+              <a:t>6/22/2023</a:t>
             </a:fld>
             <a:endParaRPr kumimoji="0" lang="en-US" sz="1200" b="0" i="0" u="none" strike="noStrike" kern="1200" cap="none" spc="0" normalizeH="0" baseline="0" noProof="0" dirty="0">
               <a:ln>
@@ -33916,7 +33945,7 @@
                 <a:tabLst/>
                 <a:defRPr/>
               </a:pPr>
-              <a:t>6/21/2023</a:t>
+              <a:t>6/22/2023</a:t>
             </a:fld>
             <a:endParaRPr kumimoji="0" lang="en-US" sz="1200" b="0" i="0" u="none" strike="noStrike" kern="1200" cap="none" spc="0" normalizeH="0" baseline="0" noProof="0" dirty="0">
               <a:ln>
@@ -34454,7 +34483,7 @@
                 <a:tabLst/>
                 <a:defRPr/>
               </a:pPr>
-              <a:t>6/21/2023</a:t>
+              <a:t>6/22/2023</a:t>
             </a:fld>
             <a:endParaRPr kumimoji="0" lang="en-US" sz="1200" b="0" i="0" u="none" strike="noStrike" kern="1200" cap="none" spc="0" normalizeH="0" baseline="0" noProof="0" dirty="0">
               <a:ln>

</xml_diff>